<commit_message>
local comming when no internet is available in the whole country
</commit_message>
<xml_diff>
--- a/AI/MID/AI-Lecture-03[Uninformed Search].pptx
+++ b/AI/MID/AI-Lecture-03[Uninformed Search].pptx
@@ -293,7 +293,7 @@
           <a:p>
             <a:fld id="{DD77A251-0E8B-4192-A3BB-F096ACC02F56}" type="datetimeFigureOut">
               <a:rPr lang="en-US" smtClean="0"/>
-              <a:t>10/12/2022</a:t>
+              <a:t>7/10/2024</a:t>
             </a:fld>
             <a:endParaRPr lang="en-US"/>
           </a:p>
@@ -678,7 +678,7 @@
           <a:p>
             <a:fld id="{4251665B-C24A-4702-B522-6A4334602E03}" type="datetimeFigureOut">
               <a:rPr lang="en-US" smtClean="0"/>
-              <a:t>10/12/2022</a:t>
+              <a:t>7/10/2024</a:t>
             </a:fld>
             <a:endParaRPr lang="en-US"/>
           </a:p>
@@ -1443,7 +1443,7 @@
           <a:p>
             <a:fld id="{4251665B-C24A-4702-B522-6A4334602E03}" type="datetimeFigureOut">
               <a:rPr lang="en-US" smtClean="0"/>
-              <a:t>10/12/2022</a:t>
+              <a:t>7/10/2024</a:t>
             </a:fld>
             <a:endParaRPr lang="en-US"/>
           </a:p>
@@ -2067,7 +2067,7 @@
           <a:p>
             <a:fld id="{4251665B-C24A-4702-B522-6A4334602E03}" type="datetimeFigureOut">
               <a:rPr lang="en-US" smtClean="0"/>
-              <a:t>10/12/2022</a:t>
+              <a:t>7/10/2024</a:t>
             </a:fld>
             <a:endParaRPr lang="en-US"/>
           </a:p>
@@ -2490,7 +2490,7 @@
           <a:p>
             <a:fld id="{4251665B-C24A-4702-B522-6A4334602E03}" type="datetimeFigureOut">
               <a:rPr lang="en-US" smtClean="0"/>
-              <a:t>10/12/2022</a:t>
+              <a:t>7/10/2024</a:t>
             </a:fld>
             <a:endParaRPr lang="en-US"/>
           </a:p>
@@ -2667,7 +2667,7 @@
           <a:p>
             <a:fld id="{4251665B-C24A-4702-B522-6A4334602E03}" type="datetimeFigureOut">
               <a:rPr lang="en-US" smtClean="0"/>
-              <a:t>10/12/2022</a:t>
+              <a:t>7/10/2024</a:t>
             </a:fld>
             <a:endParaRPr lang="en-US"/>
           </a:p>
@@ -3484,7 +3484,7 @@
           <a:p>
             <a:fld id="{4251665B-C24A-4702-B522-6A4334602E03}" type="datetimeFigureOut">
               <a:rPr lang="en-US" smtClean="0"/>
-              <a:t>10/12/2022</a:t>
+              <a:t>7/10/2024</a:t>
             </a:fld>
             <a:endParaRPr lang="en-US"/>
           </a:p>
@@ -3995,7 +3995,7 @@
           <a:p>
             <a:fld id="{4251665B-C24A-4702-B522-6A4334602E03}" type="datetimeFigureOut">
               <a:rPr lang="en-US" smtClean="0"/>
-              <a:t>10/12/2022</a:t>
+              <a:t>7/10/2024</a:t>
             </a:fld>
             <a:endParaRPr lang="en-US"/>
           </a:p>
@@ -4228,7 +4228,7 @@
           <a:p>
             <a:fld id="{4251665B-C24A-4702-B522-6A4334602E03}" type="datetimeFigureOut">
               <a:rPr lang="en-US" smtClean="0"/>
-              <a:t>10/12/2022</a:t>
+              <a:t>7/10/2024</a:t>
             </a:fld>
             <a:endParaRPr lang="en-US"/>
           </a:p>
@@ -4753,7 +4753,7 @@
           <a:p>
             <a:fld id="{4251665B-C24A-4702-B522-6A4334602E03}" type="datetimeFigureOut">
               <a:rPr lang="en-US" smtClean="0"/>
-              <a:t>10/12/2022</a:t>
+              <a:t>7/10/2024</a:t>
             </a:fld>
             <a:endParaRPr lang="en-US"/>
           </a:p>
@@ -4888,7 +4888,7 @@
           <a:p>
             <a:fld id="{4251665B-C24A-4702-B522-6A4334602E03}" type="datetimeFigureOut">
               <a:rPr lang="en-US" smtClean="0"/>
-              <a:t>10/12/2022</a:t>
+              <a:t>7/10/2024</a:t>
             </a:fld>
             <a:endParaRPr lang="en-US"/>
           </a:p>
@@ -5786,7 +5786,7 @@
           <a:p>
             <a:fld id="{4251665B-C24A-4702-B522-6A4334602E03}" type="datetimeFigureOut">
               <a:rPr lang="en-US" smtClean="0"/>
-              <a:t>10/12/2022</a:t>
+              <a:t>7/10/2024</a:t>
             </a:fld>
             <a:endParaRPr lang="en-US"/>
           </a:p>
@@ -5909,7 +5909,7 @@
           <a:p>
             <a:fld id="{4251665B-C24A-4702-B522-6A4334602E03}" type="datetimeFigureOut">
               <a:rPr lang="en-US" smtClean="0"/>
-              <a:t>10/12/2022</a:t>
+              <a:t>7/10/2024</a:t>
             </a:fld>
             <a:endParaRPr lang="en-US"/>
           </a:p>
@@ -6793,7 +6793,7 @@
           <a:p>
             <a:fld id="{4251665B-C24A-4702-B522-6A4334602E03}" type="datetimeFigureOut">
               <a:rPr lang="en-US" smtClean="0"/>
-              <a:t>10/12/2022</a:t>
+              <a:t>7/10/2024</a:t>
             </a:fld>
             <a:endParaRPr lang="en-US"/>
           </a:p>
@@ -7441,7 +7441,7 @@
           <a:p>
             <a:fld id="{4251665B-C24A-4702-B522-6A4334602E03}" type="datetimeFigureOut">
               <a:rPr lang="en-US" smtClean="0"/>
-              <a:t>10/12/2022</a:t>
+              <a:t>7/10/2024</a:t>
             </a:fld>
             <a:endParaRPr lang="en-US"/>
           </a:p>
@@ -7757,7 +7757,7 @@
           <a:p>
             <a:fld id="{4251665B-C24A-4702-B522-6A4334602E03}" type="datetimeFigureOut">
               <a:rPr lang="en-US" smtClean="0"/>
-              <a:t>10/12/2022</a:t>
+              <a:t>7/10/2024</a:t>
             </a:fld>
             <a:endParaRPr lang="en-US"/>
           </a:p>
@@ -7847,7 +7847,7 @@
           <a:p>
             <a:fld id="{4251665B-C24A-4702-B522-6A4334602E03}" type="datetimeFigureOut">
               <a:rPr lang="en-US" smtClean="0"/>
-              <a:t>10/12/2022</a:t>
+              <a:t>7/10/2024</a:t>
             </a:fld>
             <a:endParaRPr lang="en-US"/>
           </a:p>
@@ -8199,7 +8199,7 @@
           <a:p>
             <a:fld id="{4251665B-C24A-4702-B522-6A4334602E03}" type="datetimeFigureOut">
               <a:rPr lang="en-US" smtClean="0"/>
-              <a:t>10/12/2022</a:t>
+              <a:t>7/10/2024</a:t>
             </a:fld>
             <a:endParaRPr lang="en-US"/>
           </a:p>
@@ -27241,12 +27241,21 @@
 </file>
 
 <file path=customXml/item1.xml><?xml version="1.0" encoding="utf-8"?>
+<?mso-contentType ?>
+<FormTemplates xmlns="http://schemas.microsoft.com/sharepoint/v3/contenttype/forms">
+  <Display>DocumentLibraryForm</Display>
+  <Edit>DocumentLibraryForm</Edit>
+  <New>DocumentLibraryForm</New>
+</FormTemplates>
+</file>
+
+<file path=customXml/item2.xml><?xml version="1.0" encoding="utf-8"?>
 <p:properties xmlns:p="http://schemas.microsoft.com/office/2006/metadata/properties" xmlns:xsi="http://www.w3.org/2001/XMLSchema-instance" xmlns:pc="http://schemas.microsoft.com/office/infopath/2007/PartnerControls">
   <documentManagement/>
 </p:properties>
 </file>
 
-<file path=customXml/item2.xml><?xml version="1.0" encoding="utf-8"?>
+<file path=customXml/item3.xml><?xml version="1.0" encoding="utf-8"?>
 <ct:contentTypeSchema xmlns:ct="http://schemas.microsoft.com/office/2006/metadata/contentType" xmlns:ma="http://schemas.microsoft.com/office/2006/metadata/properties/metaAttributes" ct:_="" ma:_="" ma:contentTypeName="Document" ma:contentTypeID="0x0101001F810BBF67D7AB47AE77F6C7A7504E11" ma:contentTypeVersion="0" ma:contentTypeDescription="Create a new document." ma:contentTypeScope="" ma:versionID="a248ef2cc14f185a9cb0052211741135">
   <xsd:schema xmlns:xsd="http://www.w3.org/2001/XMLSchema" xmlns:xs="http://www.w3.org/2001/XMLSchema" xmlns:p="http://schemas.microsoft.com/office/2006/metadata/properties" targetNamespace="http://schemas.microsoft.com/office/2006/metadata/properties" ma:root="true" ma:fieldsID="d413257cd9829394d17656a545d5fa4e">
     <xsd:element name="properties">
@@ -27360,16 +27369,15 @@
 </ct:contentTypeSchema>
 </file>
 
-<file path=customXml/item3.xml><?xml version="1.0" encoding="utf-8"?>
-<?mso-contentType ?>
-<FormTemplates xmlns="http://schemas.microsoft.com/sharepoint/v3/contenttype/forms">
-  <Display>DocumentLibraryForm</Display>
-  <Edit>DocumentLibraryForm</Edit>
-  <New>DocumentLibraryForm</New>
-</FormTemplates>
+<file path=customXml/itemProps1.xml><?xml version="1.0" encoding="utf-8"?>
+<ds:datastoreItem xmlns:ds="http://schemas.openxmlformats.org/officeDocument/2006/customXml" ds:itemID="{28535829-AEF6-4504-A0F1-86B0570A9509}">
+  <ds:schemaRefs>
+    <ds:schemaRef ds:uri="http://schemas.microsoft.com/sharepoint/v3/contenttype/forms"/>
+  </ds:schemaRefs>
+</ds:datastoreItem>
 </file>
 
-<file path=customXml/itemProps1.xml><?xml version="1.0" encoding="utf-8"?>
+<file path=customXml/itemProps2.xml><?xml version="1.0" encoding="utf-8"?>
 <ds:datastoreItem xmlns:ds="http://schemas.openxmlformats.org/officeDocument/2006/customXml" ds:itemID="{D210A0F1-6DAE-4064-BF10-FE76C61874A2}">
   <ds:schemaRefs>
     <ds:schemaRef ds:uri="http://schemas.microsoft.com/office/2006/metadata/properties"/>
@@ -27378,7 +27386,7 @@
 </ds:datastoreItem>
 </file>
 
-<file path=customXml/itemProps2.xml><?xml version="1.0" encoding="utf-8"?>
+<file path=customXml/itemProps3.xml><?xml version="1.0" encoding="utf-8"?>
 <ds:datastoreItem xmlns:ds="http://schemas.openxmlformats.org/officeDocument/2006/customXml" ds:itemID="{77BF5235-ACB2-4168-AA8E-EDF4072F8289}">
   <ds:schemaRefs>
     <ds:schemaRef ds:uri="http://schemas.microsoft.com/office/2006/metadata/contentType"/>
@@ -27392,12 +27400,4 @@
     <ds:schemaRef ds:uri="http://schemas.microsoft.com/office/infopath/2007/PartnerControls"/>
   </ds:schemaRefs>
 </ds:datastoreItem>
-</file>
-
-<file path=customXml/itemProps3.xml><?xml version="1.0" encoding="utf-8"?>
-<ds:datastoreItem xmlns:ds="http://schemas.openxmlformats.org/officeDocument/2006/customXml" ds:itemID="{28535829-AEF6-4504-A0F1-86B0570A9509}">
-  <ds:schemaRefs>
-    <ds:schemaRef ds:uri="http://schemas.microsoft.com/sharepoint/v3/contenttype/forms"/>
-  </ds:schemaRefs>
-</ds:datastoreItem>
 </file>
</xml_diff>